<commit_message>
modificaciones header y presentacion
</commit_message>
<xml_diff>
--- a/Presentación3.pptx
+++ b/Presentación3.pptx
@@ -106,6 +106,11 @@
       </a:defRPr>
     </a:lvl9pPr>
   </p:defaultTextStyle>
+  <p:extLst>
+    <p:ext uri="{EFAFB233-063F-42B5-8137-9DF3F51BA10A}">
+      <p15:sldGuideLst xmlns:p15="http://schemas.microsoft.com/office/powerpoint/2012/main"/>
+    </p:ext>
+  </p:extLst>
 </p:presentation>
 </file>
 
@@ -3732,9 +3737,16 @@
         </p:nvSpPr>
         <p:spPr>
           <a:xfrm>
-            <a:off x="219075" y="2025888"/>
+            <a:off x="219075" y="1833630"/>
             <a:ext cx="4724401" cy="4351338"/>
           </a:xfrm>
+          <a:solidFill>
+            <a:schemeClr val="tx1">
+              <a:lumMod val="75000"/>
+              <a:lumOff val="25000"/>
+              <a:alpha val="56000"/>
+            </a:schemeClr>
+          </a:solidFill>
         </p:spPr>
         <p:txBody>
           <a:bodyPr>
@@ -3746,7 +3758,7 @@
               <a:buNone/>
             </a:pPr>
             <a:r>
-              <a:rPr lang="es-ES" sz="2200" dirty="0">
+              <a:rPr lang="es-ES" sz="1800" dirty="0">
                 <a:solidFill>
                   <a:schemeClr val="bg1"/>
                 </a:solidFill>
@@ -3759,12 +3771,12 @@
               <a:buNone/>
             </a:pPr>
             <a:r>
-              <a:rPr lang="es-ES" sz="2200" dirty="0">
+              <a:rPr lang="es-ES" sz="1800" dirty="0">
                 <a:solidFill>
                   <a:schemeClr val="bg1"/>
                 </a:solidFill>
               </a:rPr>
-              <a:t>Es importante mantener un control sobre cuantos enlaces e imágenes mostrar en el encabezado para no sobrecargar al usuario y facilitarle la navegación por nuestra web.</a:t>
+              <a:t>Es importante mantener un control sobre cuantos enlaces e imágenes mostrar en el encabezado para no sobrecargar al usuario y facilitarle la navegación por nuestra web, además de darle algo de aire y limpieza.</a:t>
             </a:r>
           </a:p>
           <a:p>
@@ -3772,12 +3784,25 @@
               <a:buNone/>
             </a:pPr>
             <a:r>
-              <a:rPr lang="es-ES" sz="2200" dirty="0">
+              <a:rPr lang="es-ES" sz="1800" dirty="0">
                 <a:solidFill>
                   <a:schemeClr val="bg1"/>
                 </a:solidFill>
               </a:rPr>
-              <a:t>Por ello se ha decidido por recortar y agrupar algunos de los enlaces para despejar el contenido del encabezado</a:t>
+              <a:t>Por ello se ha decidido por recortar y agrupar algunos de los enlaces para despejar el contenido del encabezado.</a:t>
+            </a:r>
+          </a:p>
+          <a:p>
+            <a:pPr marL="0" indent="0">
+              <a:buNone/>
+            </a:pPr>
+            <a:r>
+              <a:rPr lang="es-ES" sz="1800" dirty="0">
+                <a:solidFill>
+                  <a:schemeClr val="bg1"/>
+                </a:solidFill>
+              </a:rPr>
+              <a:t>Se ha modificado el orden para hacer más intuitiva la búsqueda de información, además de cambiar los enlaces de traducción de texto a imágenes con un título descriptivo para dotarlo de más accesibilidad y usabilidad.</a:t>
             </a:r>
           </a:p>
         </p:txBody>
@@ -3818,6 +3843,127 @@
               </a:rPr>
               <a:t>“Porque menos es más”</a:t>
             </a:r>
+          </a:p>
+        </p:txBody>
+      </p:sp>
+      <p:pic>
+        <p:nvPicPr>
+          <p:cNvPr id="6" name="Imagen 5">
+            <a:extLst>
+              <a:ext uri="{FF2B5EF4-FFF2-40B4-BE49-F238E27FC236}">
+                <a16:creationId xmlns:a16="http://schemas.microsoft.com/office/drawing/2014/main" id="{A5390EB1-290C-4186-7C9C-D2625E3D32D7}"/>
+              </a:ext>
+            </a:extLst>
+          </p:cNvPr>
+          <p:cNvPicPr>
+            <a:picLocks noChangeAspect="1"/>
+          </p:cNvPicPr>
+          <p:nvPr/>
+        </p:nvPicPr>
+        <p:blipFill>
+          <a:blip r:embed="rId2">
+            <a:extLst>
+              <a:ext uri="{28A0092B-C50C-407E-A947-70E740481C1C}">
+                <a14:useLocalDpi xmlns:a14="http://schemas.microsoft.com/office/drawing/2010/main" val="0"/>
+              </a:ext>
+            </a:extLst>
+          </a:blip>
+          <a:stretch>
+            <a:fillRect/>
+          </a:stretch>
+        </p:blipFill>
+        <p:spPr>
+          <a:xfrm>
+            <a:off x="5230273" y="1833630"/>
+            <a:ext cx="6123527" cy="1595370"/>
+          </a:xfrm>
+          <a:prstGeom prst="rect">
+            <a:avLst/>
+          </a:prstGeom>
+        </p:spPr>
+      </p:pic>
+      <p:pic>
+        <p:nvPicPr>
+          <p:cNvPr id="10" name="Imagen 9">
+            <a:extLst>
+              <a:ext uri="{FF2B5EF4-FFF2-40B4-BE49-F238E27FC236}">
+                <a16:creationId xmlns:a16="http://schemas.microsoft.com/office/drawing/2014/main" id="{1BDDABFF-8DC9-8B4A-F3D1-21AA9E51F7F4}"/>
+              </a:ext>
+            </a:extLst>
+          </p:cNvPr>
+          <p:cNvPicPr>
+            <a:picLocks noChangeAspect="1"/>
+          </p:cNvPicPr>
+          <p:nvPr/>
+        </p:nvPicPr>
+        <p:blipFill>
+          <a:blip r:embed="rId3">
+            <a:extLst>
+              <a:ext uri="{28A0092B-C50C-407E-A947-70E740481C1C}">
+                <a14:useLocalDpi xmlns:a14="http://schemas.microsoft.com/office/drawing/2010/main" val="0"/>
+              </a:ext>
+            </a:extLst>
+          </a:blip>
+          <a:stretch>
+            <a:fillRect/>
+          </a:stretch>
+        </p:blipFill>
+        <p:spPr>
+          <a:xfrm>
+            <a:off x="5183732" y="4518905"/>
+            <a:ext cx="6216604" cy="1292329"/>
+          </a:xfrm>
+          <a:prstGeom prst="rect">
+            <a:avLst/>
+          </a:prstGeom>
+        </p:spPr>
+      </p:pic>
+      <p:sp>
+        <p:nvSpPr>
+          <p:cNvPr id="11" name="Flecha: hacia abajo 10">
+            <a:extLst>
+              <a:ext uri="{FF2B5EF4-FFF2-40B4-BE49-F238E27FC236}">
+                <a16:creationId xmlns:a16="http://schemas.microsoft.com/office/drawing/2014/main" id="{DBD76408-6761-7E0E-E042-B1D5D5713F7B}"/>
+              </a:ext>
+            </a:extLst>
+          </p:cNvPr>
+          <p:cNvSpPr/>
+          <p:nvPr/>
+        </p:nvSpPr>
+        <p:spPr>
+          <a:xfrm>
+            <a:off x="8056060" y="3737701"/>
+            <a:ext cx="471948" cy="604674"/>
+          </a:xfrm>
+          <a:prstGeom prst="downArrow">
+            <a:avLst/>
+          </a:prstGeom>
+          <a:solidFill>
+            <a:schemeClr val="bg2"/>
+          </a:solidFill>
+        </p:spPr>
+        <p:style>
+          <a:lnRef idx="2">
+            <a:schemeClr val="accent1">
+              <a:shade val="50000"/>
+            </a:schemeClr>
+          </a:lnRef>
+          <a:fillRef idx="1">
+            <a:schemeClr val="accent1"/>
+          </a:fillRef>
+          <a:effectRef idx="0">
+            <a:schemeClr val="accent1"/>
+          </a:effectRef>
+          <a:fontRef idx="minor">
+            <a:schemeClr val="lt1"/>
+          </a:fontRef>
+        </p:style>
+        <p:txBody>
+          <a:bodyPr rtlCol="0" anchor="ctr"/>
+          <a:lstStyle/>
+          <a:p>
+            <a:pPr algn="ctr"/>
+            <a:endParaRPr lang="es-ES"/>
           </a:p>
         </p:txBody>
       </p:sp>

</xml_diff>